<commit_message>
bugfix for broken links and output regeneration
</commit_message>
<xml_diff>
--- a/docs/week-3-stack/ce205-week-3-stack.md_word.pptx
+++ b/docs/week-3-stack/ce205-week-3-stack.md_word.pptx
@@ -3405,12 +3405,7 @@
             <p:ph type="title"/>
           </p:nvPr>
         </p:nvSpPr>
-        <p:spPr>
-          <a:xfrm>
-            <a:off x="722313" y="4406900"/>
-            <a:ext cx="7772400" cy="1362075"/>
-          </a:xfrm>
-        </p:spPr>
+        <p:spPr/>
         <p:txBody>
           <a:bodyPr/>
           <a:lstStyle/>
@@ -3421,6 +3416,57 @@
             <a:r>
               <a:rPr/>
               <a:t>Stacks, Queue Structures, and Related Algorithms and Problems.</a:t>
+            </a:r>
+          </a:p>
+        </p:txBody>
+      </p:sp>
+      <p:sp>
+        <p:nvSpPr>
+          <p:cNvPr id="3" name="Content Placeholder 2"/>
+          <p:cNvSpPr>
+            <a:spLocks noGrp="1"/>
+          </p:cNvSpPr>
+          <p:nvPr>
+            <p:ph idx="1"/>
+          </p:nvPr>
+        </p:nvSpPr>
+        <p:spPr/>
+        <p:txBody>
+          <a:bodyPr/>
+          <a:lstStyle/>
+          <a:p>
+            <a:pPr lvl="0" indent="0" marL="0">
+              <a:buNone/>
+            </a:pPr>
+            <a:r>
+              <a:rPr/>
+              <a:t>Download </a:t>
+            </a:r>
+            <a:r>
+              <a:rPr>
+                <a:hlinkClick r:id="rId2"/>
+              </a:rPr>
+              <a:t>DOC</a:t>
+            </a:r>
+            <a:r>
+              <a:rPr/>
+              <a:t>, </a:t>
+            </a:r>
+            <a:r>
+              <a:rPr>
+                <a:hlinkClick r:id="rId3"/>
+              </a:rPr>
+              <a:t>SLIDE</a:t>
+            </a:r>
+            <a:r>
+              <a:rPr/>
+              <a:t>, </a:t>
+            </a:r>
+            <a:r>
+              <a:rPr>
+                <a:hlinkClick r:id="rId4"/>
+              </a:rPr>
+              <a:t>PPTX</a:t>
             </a:r>
           </a:p>
         </p:txBody>

</xml_diff>